<commit_message>
Update files for serve God
</commit_message>
<xml_diff>
--- a/_offering_song_slide/_slide/_I_have_decided_to_follow_Jesus.pptx
+++ b/_offering_song_slide/_slide/_I_have_decided_to_follow_Jesus.pptx
@@ -7,13 +7,13 @@
   <p:sldIdLst>
     <p:sldId id="256" r:id="rId2"/>
     <p:sldId id="257" r:id="rId3"/>
-    <p:sldId id="260" r:id="rId4"/>
+    <p:sldId id="267" r:id="rId4"/>
     <p:sldId id="261" r:id="rId5"/>
-    <p:sldId id="262" r:id="rId6"/>
+    <p:sldId id="268" r:id="rId6"/>
     <p:sldId id="263" r:id="rId7"/>
-    <p:sldId id="264" r:id="rId8"/>
-    <p:sldId id="265" r:id="rId9"/>
-    <p:sldId id="266" r:id="rId10"/>
+    <p:sldId id="269" r:id="rId8"/>
+    <p:sldId id="264" r:id="rId9"/>
+    <p:sldId id="270" r:id="rId10"/>
   </p:sldIdLst>
   <p:sldSz cx="12192000" cy="6858000"/>
   <p:notesSz cx="6858000" cy="9144000"/>
@@ -112,6 +112,11 @@
       </a:defRPr>
     </a:lvl9pPr>
   </p:defaultTextStyle>
+  <p:extLst>
+    <p:ext uri="{EFAFB233-063F-42B5-8137-9DF3F51BA10A}">
+      <p15:sldGuideLst xmlns:p15="http://schemas.microsoft.com/office/powerpoint/2012/main"/>
+    </p:ext>
+  </p:extLst>
 </p:presentation>
 </file>
 
@@ -262,7 +267,7 @@
           <a:p>
             <a:fld id="{D6D40339-3EA9-B841-98F8-12F522DD711A}" type="datetimeFigureOut">
               <a:rPr lang="en-US" smtClean="0"/>
-              <a:t>10/21/23</a:t>
+              <a:t>11/12/23</a:t>
             </a:fld>
             <a:endParaRPr lang="en-US"/>
           </a:p>
@@ -460,7 +465,7 @@
           <a:p>
             <a:fld id="{D6D40339-3EA9-B841-98F8-12F522DD711A}" type="datetimeFigureOut">
               <a:rPr lang="en-US" smtClean="0"/>
-              <a:t>10/21/23</a:t>
+              <a:t>11/12/23</a:t>
             </a:fld>
             <a:endParaRPr lang="en-US"/>
           </a:p>
@@ -668,7 +673,7 @@
           <a:p>
             <a:fld id="{D6D40339-3EA9-B841-98F8-12F522DD711A}" type="datetimeFigureOut">
               <a:rPr lang="en-US" smtClean="0"/>
-              <a:t>10/21/23</a:t>
+              <a:t>11/12/23</a:t>
             </a:fld>
             <a:endParaRPr lang="en-US"/>
           </a:p>
@@ -866,7 +871,7 @@
           <a:p>
             <a:fld id="{D6D40339-3EA9-B841-98F8-12F522DD711A}" type="datetimeFigureOut">
               <a:rPr lang="en-US" smtClean="0"/>
-              <a:t>10/21/23</a:t>
+              <a:t>11/12/23</a:t>
             </a:fld>
             <a:endParaRPr lang="en-US"/>
           </a:p>
@@ -1141,7 +1146,7 @@
           <a:p>
             <a:fld id="{D6D40339-3EA9-B841-98F8-12F522DD711A}" type="datetimeFigureOut">
               <a:rPr lang="en-US" smtClean="0"/>
-              <a:t>10/21/23</a:t>
+              <a:t>11/12/23</a:t>
             </a:fld>
             <a:endParaRPr lang="en-US"/>
           </a:p>
@@ -1406,7 +1411,7 @@
           <a:p>
             <a:fld id="{D6D40339-3EA9-B841-98F8-12F522DD711A}" type="datetimeFigureOut">
               <a:rPr lang="en-US" smtClean="0"/>
-              <a:t>10/21/23</a:t>
+              <a:t>11/12/23</a:t>
             </a:fld>
             <a:endParaRPr lang="en-US"/>
           </a:p>
@@ -1818,7 +1823,7 @@
           <a:p>
             <a:fld id="{D6D40339-3EA9-B841-98F8-12F522DD711A}" type="datetimeFigureOut">
               <a:rPr lang="en-US" smtClean="0"/>
-              <a:t>10/21/23</a:t>
+              <a:t>11/12/23</a:t>
             </a:fld>
             <a:endParaRPr lang="en-US"/>
           </a:p>
@@ -1959,7 +1964,7 @@
           <a:p>
             <a:fld id="{D6D40339-3EA9-B841-98F8-12F522DD711A}" type="datetimeFigureOut">
               <a:rPr lang="en-US" smtClean="0"/>
-              <a:t>10/21/23</a:t>
+              <a:t>11/12/23</a:t>
             </a:fld>
             <a:endParaRPr lang="en-US"/>
           </a:p>
@@ -2072,7 +2077,7 @@
           <a:p>
             <a:fld id="{D6D40339-3EA9-B841-98F8-12F522DD711A}" type="datetimeFigureOut">
               <a:rPr lang="en-US" smtClean="0"/>
-              <a:t>10/21/23</a:t>
+              <a:t>11/12/23</a:t>
             </a:fld>
             <a:endParaRPr lang="en-US"/>
           </a:p>
@@ -2383,7 +2388,7 @@
           <a:p>
             <a:fld id="{D6D40339-3EA9-B841-98F8-12F522DD711A}" type="datetimeFigureOut">
               <a:rPr lang="en-US" smtClean="0"/>
-              <a:t>10/21/23</a:t>
+              <a:t>11/12/23</a:t>
             </a:fld>
             <a:endParaRPr lang="en-US"/>
           </a:p>
@@ -2671,7 +2676,7 @@
           <a:p>
             <a:fld id="{D6D40339-3EA9-B841-98F8-12F522DD711A}" type="datetimeFigureOut">
               <a:rPr lang="en-US" smtClean="0"/>
-              <a:t>10/21/23</a:t>
+              <a:t>11/12/23</a:t>
             </a:fld>
             <a:endParaRPr lang="en-US"/>
           </a:p>
@@ -2921,7 +2926,7 @@
           <a:p>
             <a:fld id="{D6D40339-3EA9-B841-98F8-12F522DD711A}" type="datetimeFigureOut">
               <a:rPr lang="en-US" smtClean="0"/>
-              <a:t>10/21/23</a:t>
+              <a:t>11/12/23</a:t>
             </a:fld>
             <a:endParaRPr lang="en-US"/>
           </a:p>
@@ -3474,7 +3479,7 @@
         </p:nvSpPr>
         <p:spPr>
           <a:xfrm>
-            <a:off x="0" y="857839"/>
+            <a:off x="195209" y="868113"/>
             <a:ext cx="7777114" cy="1446550"/>
           </a:xfrm>
           <a:prstGeom prst="rect">
@@ -3494,7 +3499,7 @@
                   <a:schemeClr val="bg1"/>
                 </a:solidFill>
                 <a:effectLst/>
-                <a:latin typeface="Menlo" panose="020B0609030804020204" pitchFamily="49" charset="0"/>
+                <a:latin typeface="Cambria" panose="02040503050406030204" pitchFamily="18" charset="0"/>
               </a:rPr>
               <a:t>I HAVE DECIDED </a:t>
             </a:r>
@@ -3506,7 +3511,7 @@
                   <a:schemeClr val="bg1"/>
                 </a:solidFill>
                 <a:effectLst/>
-                <a:latin typeface="Menlo" panose="020B0609030804020204" pitchFamily="49" charset="0"/>
+                <a:latin typeface="Cambria" panose="02040503050406030204" pitchFamily="18" charset="0"/>
               </a:rPr>
               <a:t>TO FOLLOW JESUS</a:t>
             </a:r>
@@ -3514,6 +3519,7 @@
               <a:solidFill>
                 <a:schemeClr val="bg1"/>
               </a:solidFill>
+              <a:latin typeface="Cambria" panose="02040503050406030204" pitchFamily="18" charset="0"/>
             </a:endParaRPr>
           </a:p>
         </p:txBody>
@@ -3532,7 +3538,7 @@
         </p:nvSpPr>
         <p:spPr>
           <a:xfrm>
-            <a:off x="0" y="2304389"/>
+            <a:off x="195209" y="2314663"/>
             <a:ext cx="7777114" cy="1446550"/>
           </a:xfrm>
           <a:prstGeom prst="rect">
@@ -3574,9 +3580,7 @@
                 <a:effectLst/>
                 <a:uLnTx/>
                 <a:uFillTx/>
-                <a:latin typeface="Menlo" panose="020B0609030804020204" pitchFamily="49" charset="0"/>
-                <a:ea typeface="+mn-ea"/>
-                <a:cs typeface="+mn-cs"/>
+                <a:latin typeface="Cambria" panose="02040503050406030204" pitchFamily="18" charset="0"/>
               </a:rPr>
               <a:t>I HAVE DECIDED </a:t>
             </a:r>
@@ -3610,26 +3614,10 @@
                 <a:effectLst/>
                 <a:uLnTx/>
                 <a:uFillTx/>
-                <a:latin typeface="Menlo" panose="020B0609030804020204" pitchFamily="49" charset="0"/>
-                <a:ea typeface="+mn-ea"/>
-                <a:cs typeface="+mn-cs"/>
+                <a:latin typeface="Cambria" panose="02040503050406030204" pitchFamily="18" charset="0"/>
               </a:rPr>
               <a:t>TO FOLLOW JESUS</a:t>
             </a:r>
-            <a:endParaRPr kumimoji="0" lang="en-US" sz="4400" b="1" i="0" u="none" strike="noStrike" kern="1200" cap="none" spc="0" normalizeH="0" baseline="0" noProof="0" dirty="0">
-              <a:ln>
-                <a:noFill/>
-              </a:ln>
-              <a:solidFill>
-                <a:prstClr val="white"/>
-              </a:solidFill>
-              <a:effectLst/>
-              <a:uLnTx/>
-              <a:uFillTx/>
-              <a:latin typeface="Calibri" panose="020F0502020204030204"/>
-              <a:ea typeface="+mn-ea"/>
-              <a:cs typeface="+mn-cs"/>
-            </a:endParaRPr>
           </a:p>
         </p:txBody>
       </p:sp>
@@ -3677,7 +3665,7 @@
         </p:nvSpPr>
         <p:spPr>
           <a:xfrm>
-            <a:off x="0" y="857839"/>
+            <a:off x="195209" y="868113"/>
             <a:ext cx="7777114" cy="1446550"/>
           </a:xfrm>
           <a:prstGeom prst="rect">
@@ -3697,7 +3685,7 @@
                   <a:schemeClr val="bg1"/>
                 </a:solidFill>
                 <a:effectLst/>
-                <a:latin typeface="Menlo" panose="020B0609030804020204" pitchFamily="49" charset="0"/>
+                <a:latin typeface="Cambria" panose="02040503050406030204" pitchFamily="18" charset="0"/>
               </a:rPr>
               <a:t>I HAVE DECIDED </a:t>
             </a:r>
@@ -3709,7 +3697,7 @@
                   <a:schemeClr val="bg1"/>
                 </a:solidFill>
                 <a:effectLst/>
-                <a:latin typeface="Menlo" panose="020B0609030804020204" pitchFamily="49" charset="0"/>
+                <a:latin typeface="Cambria" panose="02040503050406030204" pitchFamily="18" charset="0"/>
               </a:rPr>
               <a:t>TO FOLLOW JESUS</a:t>
             </a:r>
@@ -3717,6 +3705,7 @@
               <a:solidFill>
                 <a:schemeClr val="bg1"/>
               </a:solidFill>
+              <a:latin typeface="Cambria" panose="02040503050406030204" pitchFamily="18" charset="0"/>
             </a:endParaRPr>
           </a:p>
         </p:txBody>
@@ -3735,7 +3724,7 @@
         </p:nvSpPr>
         <p:spPr>
           <a:xfrm>
-            <a:off x="0" y="2304389"/>
+            <a:off x="195209" y="2314663"/>
             <a:ext cx="7777114" cy="1446550"/>
           </a:xfrm>
           <a:prstGeom prst="rect">
@@ -3749,30 +3738,77 @@
           </a:bodyPr>
           <a:lstStyle/>
           <a:p>
+            <a:pPr marL="0" marR="0" lvl="0" indent="0" algn="l" defTabSz="914400" rtl="0" eaLnBrk="1" fontAlgn="auto" latinLnBrk="0" hangingPunct="1">
+              <a:lnSpc>
+                <a:spcPct val="100000"/>
+              </a:lnSpc>
+              <a:spcBef>
+                <a:spcPts val="0"/>
+              </a:spcBef>
+              <a:spcAft>
+                <a:spcPts val="0"/>
+              </a:spcAft>
+              <a:buClrTx/>
+              <a:buSzTx/>
+              <a:buFontTx/>
+              <a:buNone/>
+              <a:tabLst/>
+              <a:defRPr/>
+            </a:pPr>
+            <a:r>
+              <a:rPr kumimoji="0" lang="en-US" sz="4400" b="1" i="0" u="none" strike="noStrike" kern="1200" cap="none" spc="0" normalizeH="0" baseline="0" noProof="0" dirty="0">
+                <a:ln>
+                  <a:noFill/>
+                </a:ln>
+                <a:solidFill>
+                  <a:prstClr val="white"/>
+                </a:solidFill>
+                <a:effectLst/>
+                <a:uLnTx/>
+                <a:uFillTx/>
+                <a:latin typeface="Cambria" panose="02040503050406030204" pitchFamily="18" charset="0"/>
+              </a:rPr>
+              <a:t>NO TURNING BACK …</a:t>
+            </a:r>
+          </a:p>
+          <a:p>
+            <a:pPr marL="0" marR="0" lvl="0" indent="0" algn="l" defTabSz="914400" rtl="0" eaLnBrk="1" fontAlgn="auto" latinLnBrk="0" hangingPunct="1">
+              <a:lnSpc>
+                <a:spcPct val="100000"/>
+              </a:lnSpc>
+              <a:spcBef>
+                <a:spcPts val="0"/>
+              </a:spcBef>
+              <a:spcAft>
+                <a:spcPts val="0"/>
+              </a:spcAft>
+              <a:buClrTx/>
+              <a:buSzTx/>
+              <a:buFontTx/>
+              <a:buNone/>
+              <a:tabLst/>
+              <a:defRPr/>
+            </a:pPr>
             <a:r>
               <a:rPr lang="en-US" sz="4400" b="1" dirty="0">
                 <a:solidFill>
-                  <a:schemeClr val="bg1"/>
+                  <a:prstClr val="white"/>
                 </a:solidFill>
-                <a:latin typeface="Menlo" panose="020B0609030804020204" pitchFamily="49" charset="0"/>
-              </a:rPr>
-              <a:t>NO TURNING BACK...</a:t>
-            </a:r>
-          </a:p>
-          <a:p>
-            <a:r>
-              <a:rPr lang="en-US" sz="4400" b="1" dirty="0">
-                <a:solidFill>
-                  <a:schemeClr val="bg1"/>
-                </a:solidFill>
-                <a:latin typeface="Menlo" panose="020B0609030804020204" pitchFamily="49" charset="0"/>
+                <a:latin typeface="Cambria" panose="02040503050406030204" pitchFamily="18" charset="0"/>
               </a:rPr>
               <a:t>NO TURNING BACK.</a:t>
             </a:r>
-            <a:endParaRPr lang="en-US" sz="4400" b="1" dirty="0">
+            <a:endParaRPr kumimoji="0" lang="en-US" sz="4400" b="1" i="0" u="none" strike="noStrike" kern="1200" cap="none" spc="0" normalizeH="0" baseline="0" noProof="0" dirty="0">
+              <a:ln>
+                <a:noFill/>
+              </a:ln>
               <a:solidFill>
-                <a:schemeClr val="bg1"/>
+                <a:prstClr val="white"/>
               </a:solidFill>
+              <a:effectLst/>
+              <a:uLnTx/>
+              <a:uFillTx/>
+              <a:latin typeface="Cambria" panose="02040503050406030204" pitchFamily="18" charset="0"/>
             </a:endParaRPr>
           </a:p>
         </p:txBody>
@@ -3780,7 +3816,7 @@
     </p:spTree>
     <p:extLst>
       <p:ext uri="{BB962C8B-B14F-4D97-AF65-F5344CB8AC3E}">
-        <p14:creationId xmlns:p14="http://schemas.microsoft.com/office/powerpoint/2010/main" val="402762402"/>
+        <p14:creationId xmlns:p14="http://schemas.microsoft.com/office/powerpoint/2010/main" val="2808447808"/>
       </p:ext>
     </p:extLst>
   </p:cSld>
@@ -3809,10 +3845,10 @@
       </p:grpSpPr>
       <p:sp>
         <p:nvSpPr>
-          <p:cNvPr id="4" name="TextBox 3">
-            <a:extLst>
-              <a:ext uri="{FF2B5EF4-FFF2-40B4-BE49-F238E27FC236}">
-                <a16:creationId xmlns:a16="http://schemas.microsoft.com/office/drawing/2014/main" id="{367E8093-9F57-3724-26D0-5358AC1040DA}"/>
+          <p:cNvPr id="8" name="TextBox 7">
+            <a:extLst>
+              <a:ext uri="{FF2B5EF4-FFF2-40B4-BE49-F238E27FC236}">
+                <a16:creationId xmlns:a16="http://schemas.microsoft.com/office/drawing/2014/main" id="{1D0AE4A5-2496-C0D7-59EC-435D0947859C}"/>
               </a:ext>
             </a:extLst>
           </p:cNvPr>
@@ -3821,7 +3857,7 @@
         </p:nvSpPr>
         <p:spPr>
           <a:xfrm>
-            <a:off x="0" y="857839"/>
+            <a:off x="195209" y="868113"/>
             <a:ext cx="7777114" cy="1446550"/>
           </a:xfrm>
           <a:prstGeom prst="rect">
@@ -3840,7 +3876,7 @@
                 <a:solidFill>
                   <a:schemeClr val="bg1"/>
                 </a:solidFill>
-                <a:latin typeface="Menlo" panose="020B0609030804020204" pitchFamily="49" charset="0"/>
+                <a:latin typeface="Cambria" panose="02040503050406030204" pitchFamily="18" charset="0"/>
               </a:rPr>
               <a:t>THOUGH I MAY WONDER, </a:t>
             </a:r>
@@ -3851,7 +3887,7 @@
                 <a:solidFill>
                   <a:schemeClr val="bg1"/>
                 </a:solidFill>
-                <a:latin typeface="Menlo" panose="020B0609030804020204" pitchFamily="49" charset="0"/>
+                <a:latin typeface="Cambria" panose="02040503050406030204" pitchFamily="18" charset="0"/>
               </a:rPr>
               <a:t>I STILL WILL FOLLOW</a:t>
             </a:r>
@@ -3860,10 +3896,10 @@
       </p:sp>
       <p:sp>
         <p:nvSpPr>
-          <p:cNvPr id="5" name="TextBox 4">
-            <a:extLst>
-              <a:ext uri="{FF2B5EF4-FFF2-40B4-BE49-F238E27FC236}">
-                <a16:creationId xmlns:a16="http://schemas.microsoft.com/office/drawing/2014/main" id="{5A46E485-94B9-08B6-7B44-69ADEFF68F15}"/>
+          <p:cNvPr id="9" name="TextBox 8">
+            <a:extLst>
+              <a:ext uri="{FF2B5EF4-FFF2-40B4-BE49-F238E27FC236}">
+                <a16:creationId xmlns:a16="http://schemas.microsoft.com/office/drawing/2014/main" id="{4E463C03-C125-709C-EF80-05A5CA93804A}"/>
               </a:ext>
             </a:extLst>
           </p:cNvPr>
@@ -3872,7 +3908,7 @@
         </p:nvSpPr>
         <p:spPr>
           <a:xfrm>
-            <a:off x="0" y="2304389"/>
+            <a:off x="195209" y="2314663"/>
             <a:ext cx="7777114" cy="1446550"/>
           </a:xfrm>
           <a:prstGeom prst="rect">
@@ -3891,7 +3927,7 @@
                 <a:solidFill>
                   <a:schemeClr val="bg1"/>
                 </a:solidFill>
-                <a:latin typeface="Menlo" panose="020B0609030804020204" pitchFamily="49" charset="0"/>
+                <a:latin typeface="Cambria" panose="02040503050406030204" pitchFamily="18" charset="0"/>
               </a:rPr>
               <a:t>THOUGH I MAY WONDER, </a:t>
             </a:r>
@@ -3902,7 +3938,7 @@
                 <a:solidFill>
                   <a:schemeClr val="bg1"/>
                 </a:solidFill>
-                <a:latin typeface="Menlo" panose="020B0609030804020204" pitchFamily="49" charset="0"/>
+                <a:latin typeface="Cambria" panose="02040503050406030204" pitchFamily="18" charset="0"/>
               </a:rPr>
               <a:t>I STILL WILL FOLLOW</a:t>
             </a:r>
@@ -3941,10 +3977,10 @@
       </p:grpSpPr>
       <p:sp>
         <p:nvSpPr>
-          <p:cNvPr id="4" name="TextBox 3">
-            <a:extLst>
-              <a:ext uri="{FF2B5EF4-FFF2-40B4-BE49-F238E27FC236}">
-                <a16:creationId xmlns:a16="http://schemas.microsoft.com/office/drawing/2014/main" id="{367E8093-9F57-3724-26D0-5358AC1040DA}"/>
+          <p:cNvPr id="8" name="TextBox 7">
+            <a:extLst>
+              <a:ext uri="{FF2B5EF4-FFF2-40B4-BE49-F238E27FC236}">
+                <a16:creationId xmlns:a16="http://schemas.microsoft.com/office/drawing/2014/main" id="{1D0AE4A5-2496-C0D7-59EC-435D0947859C}"/>
               </a:ext>
             </a:extLst>
           </p:cNvPr>
@@ -3953,7 +3989,7 @@
         </p:nvSpPr>
         <p:spPr>
           <a:xfrm>
-            <a:off x="0" y="857839"/>
+            <a:off x="195209" y="868113"/>
             <a:ext cx="7777114" cy="1446550"/>
           </a:xfrm>
           <a:prstGeom prst="rect">
@@ -3972,7 +4008,7 @@
                 <a:solidFill>
                   <a:schemeClr val="bg1"/>
                 </a:solidFill>
-                <a:latin typeface="Menlo" panose="020B0609030804020204" pitchFamily="49" charset="0"/>
+                <a:latin typeface="Cambria" panose="02040503050406030204" pitchFamily="18" charset="0"/>
               </a:rPr>
               <a:t>THOUGH I MAY WONDER, </a:t>
             </a:r>
@@ -3983,7 +4019,7 @@
                 <a:solidFill>
                   <a:schemeClr val="bg1"/>
                 </a:solidFill>
-                <a:latin typeface="Menlo" panose="020B0609030804020204" pitchFamily="49" charset="0"/>
+                <a:latin typeface="Cambria" panose="02040503050406030204" pitchFamily="18" charset="0"/>
               </a:rPr>
               <a:t>I STILL WILL FOLLOW</a:t>
             </a:r>
@@ -3992,10 +4028,10 @@
       </p:sp>
       <p:sp>
         <p:nvSpPr>
-          <p:cNvPr id="5" name="TextBox 4">
-            <a:extLst>
-              <a:ext uri="{FF2B5EF4-FFF2-40B4-BE49-F238E27FC236}">
-                <a16:creationId xmlns:a16="http://schemas.microsoft.com/office/drawing/2014/main" id="{5A46E485-94B9-08B6-7B44-69ADEFF68F15}"/>
+          <p:cNvPr id="9" name="TextBox 8">
+            <a:extLst>
+              <a:ext uri="{FF2B5EF4-FFF2-40B4-BE49-F238E27FC236}">
+                <a16:creationId xmlns:a16="http://schemas.microsoft.com/office/drawing/2014/main" id="{4E463C03-C125-709C-EF80-05A5CA93804A}"/>
               </a:ext>
             </a:extLst>
           </p:cNvPr>
@@ -4004,7 +4040,7 @@
         </p:nvSpPr>
         <p:spPr>
           <a:xfrm>
-            <a:off x="0" y="2304389"/>
+            <a:off x="195209" y="2314663"/>
             <a:ext cx="7777114" cy="1446550"/>
           </a:xfrm>
           <a:prstGeom prst="rect">
@@ -4023,9 +4059,9 @@
                 <a:solidFill>
                   <a:schemeClr val="bg1"/>
                 </a:solidFill>
-                <a:latin typeface="Menlo" panose="020B0609030804020204" pitchFamily="49" charset="0"/>
+                <a:latin typeface="Cambria" panose="02040503050406030204" pitchFamily="18" charset="0"/>
               </a:rPr>
-              <a:t>NO TURNING BACK... </a:t>
+              <a:t>NO TURNING BACK …</a:t>
             </a:r>
           </a:p>
           <a:p>
@@ -4034,7 +4070,7 @@
                 <a:solidFill>
                   <a:schemeClr val="bg1"/>
                 </a:solidFill>
-                <a:latin typeface="Menlo" panose="020B0609030804020204" pitchFamily="49" charset="0"/>
+                <a:latin typeface="Cambria" panose="02040503050406030204" pitchFamily="18" charset="0"/>
               </a:rPr>
               <a:t>NO TURNING BACK.</a:t>
             </a:r>
@@ -4044,7 +4080,7 @@
     </p:spTree>
     <p:extLst>
       <p:ext uri="{BB962C8B-B14F-4D97-AF65-F5344CB8AC3E}">
-        <p14:creationId xmlns:p14="http://schemas.microsoft.com/office/powerpoint/2010/main" val="3189451181"/>
+        <p14:creationId xmlns:p14="http://schemas.microsoft.com/office/powerpoint/2010/main" val="736191119"/>
       </p:ext>
     </p:extLst>
   </p:cSld>
@@ -4073,10 +4109,10 @@
       </p:grpSpPr>
       <p:sp>
         <p:nvSpPr>
-          <p:cNvPr id="4" name="TextBox 3">
-            <a:extLst>
-              <a:ext uri="{FF2B5EF4-FFF2-40B4-BE49-F238E27FC236}">
-                <a16:creationId xmlns:a16="http://schemas.microsoft.com/office/drawing/2014/main" id="{367E8093-9F57-3724-26D0-5358AC1040DA}"/>
+          <p:cNvPr id="2" name="TextBox 1">
+            <a:extLst>
+              <a:ext uri="{FF2B5EF4-FFF2-40B4-BE49-F238E27FC236}">
+                <a16:creationId xmlns:a16="http://schemas.microsoft.com/office/drawing/2014/main" id="{2A3DD0E4-D360-0DA6-1F4D-737D049355D2}"/>
               </a:ext>
             </a:extLst>
           </p:cNvPr>
@@ -4085,7 +4121,7 @@
         </p:nvSpPr>
         <p:spPr>
           <a:xfrm>
-            <a:off x="0" y="857839"/>
+            <a:off x="195209" y="868113"/>
             <a:ext cx="7777114" cy="1446550"/>
           </a:xfrm>
           <a:prstGeom prst="rect">
@@ -4104,7 +4140,7 @@
                 <a:solidFill>
                   <a:schemeClr val="bg1"/>
                 </a:solidFill>
-                <a:latin typeface="Menlo" panose="020B0609030804020204" pitchFamily="49" charset="0"/>
+                <a:latin typeface="Cambria" panose="02040503050406030204" pitchFamily="18" charset="0"/>
               </a:rPr>
               <a:t>THE WORLD BEHIND ME, THE CROSS BEFORE ME</a:t>
             </a:r>
@@ -4113,10 +4149,10 @@
       </p:sp>
       <p:sp>
         <p:nvSpPr>
-          <p:cNvPr id="5" name="TextBox 4">
-            <a:extLst>
-              <a:ext uri="{FF2B5EF4-FFF2-40B4-BE49-F238E27FC236}">
-                <a16:creationId xmlns:a16="http://schemas.microsoft.com/office/drawing/2014/main" id="{5A46E485-94B9-08B6-7B44-69ADEFF68F15}"/>
+          <p:cNvPr id="3" name="TextBox 2">
+            <a:extLst>
+              <a:ext uri="{FF2B5EF4-FFF2-40B4-BE49-F238E27FC236}">
+                <a16:creationId xmlns:a16="http://schemas.microsoft.com/office/drawing/2014/main" id="{180672A0-06CC-F2C3-9E13-1446C8D52106}"/>
               </a:ext>
             </a:extLst>
           </p:cNvPr>
@@ -4125,7 +4161,7 @@
         </p:nvSpPr>
         <p:spPr>
           <a:xfrm>
-            <a:off x="0" y="2304389"/>
+            <a:off x="195209" y="2314663"/>
             <a:ext cx="7777114" cy="1446550"/>
           </a:xfrm>
           <a:prstGeom prst="rect">
@@ -4144,7 +4180,7 @@
                 <a:solidFill>
                   <a:schemeClr val="bg1"/>
                 </a:solidFill>
-                <a:latin typeface="Menlo" panose="020B0609030804020204" pitchFamily="49" charset="0"/>
+                <a:latin typeface="Cambria" panose="02040503050406030204" pitchFamily="18" charset="0"/>
               </a:rPr>
               <a:t>THE WORLD BEHIND ME, THE CROSS BEFORE ME</a:t>
             </a:r>
@@ -4183,10 +4219,10 @@
       </p:grpSpPr>
       <p:sp>
         <p:nvSpPr>
-          <p:cNvPr id="4" name="TextBox 3">
-            <a:extLst>
-              <a:ext uri="{FF2B5EF4-FFF2-40B4-BE49-F238E27FC236}">
-                <a16:creationId xmlns:a16="http://schemas.microsoft.com/office/drawing/2014/main" id="{367E8093-9F57-3724-26D0-5358AC1040DA}"/>
+          <p:cNvPr id="2" name="TextBox 1">
+            <a:extLst>
+              <a:ext uri="{FF2B5EF4-FFF2-40B4-BE49-F238E27FC236}">
+                <a16:creationId xmlns:a16="http://schemas.microsoft.com/office/drawing/2014/main" id="{2A3DD0E4-D360-0DA6-1F4D-737D049355D2}"/>
               </a:ext>
             </a:extLst>
           </p:cNvPr>
@@ -4195,7 +4231,7 @@
         </p:nvSpPr>
         <p:spPr>
           <a:xfrm>
-            <a:off x="0" y="857839"/>
+            <a:off x="195209" y="868113"/>
             <a:ext cx="7777114" cy="1446550"/>
           </a:xfrm>
           <a:prstGeom prst="rect">
@@ -4214,30 +4250,19 @@
                 <a:solidFill>
                   <a:schemeClr val="bg1"/>
                 </a:solidFill>
-                <a:latin typeface="Menlo" panose="020B0609030804020204" pitchFamily="49" charset="0"/>
+                <a:latin typeface="Cambria" panose="02040503050406030204" pitchFamily="18" charset="0"/>
               </a:rPr>
-              <a:t>THOUGH I MAY WONDER, </a:t>
-            </a:r>
-          </a:p>
-          <a:p>
-            <a:r>
-              <a:rPr lang="en-US" sz="4400" b="1" dirty="0">
-                <a:solidFill>
-                  <a:schemeClr val="bg1"/>
-                </a:solidFill>
-                <a:latin typeface="Menlo" panose="020B0609030804020204" pitchFamily="49" charset="0"/>
-              </a:rPr>
-              <a:t>I STILL WILL FOLLOW</a:t>
-            </a:r>
-          </a:p>
-        </p:txBody>
-      </p:sp>
-      <p:sp>
-        <p:nvSpPr>
-          <p:cNvPr id="5" name="TextBox 4">
-            <a:extLst>
-              <a:ext uri="{FF2B5EF4-FFF2-40B4-BE49-F238E27FC236}">
-                <a16:creationId xmlns:a16="http://schemas.microsoft.com/office/drawing/2014/main" id="{5A46E485-94B9-08B6-7B44-69ADEFF68F15}"/>
+              <a:t>THE WORLD BEHIND ME, THE CROSS BEFORE ME</a:t>
+            </a:r>
+          </a:p>
+        </p:txBody>
+      </p:sp>
+      <p:sp>
+        <p:nvSpPr>
+          <p:cNvPr id="3" name="TextBox 2">
+            <a:extLst>
+              <a:ext uri="{FF2B5EF4-FFF2-40B4-BE49-F238E27FC236}">
+                <a16:creationId xmlns:a16="http://schemas.microsoft.com/office/drawing/2014/main" id="{180672A0-06CC-F2C3-9E13-1446C8D52106}"/>
               </a:ext>
             </a:extLst>
           </p:cNvPr>
@@ -4246,7 +4271,7 @@
         </p:nvSpPr>
         <p:spPr>
           <a:xfrm>
-            <a:off x="0" y="2304389"/>
+            <a:off x="195209" y="2314663"/>
             <a:ext cx="7777114" cy="1446550"/>
           </a:xfrm>
           <a:prstGeom prst="rect">
@@ -4265,9 +4290,9 @@
                 <a:solidFill>
                   <a:schemeClr val="bg1"/>
                 </a:solidFill>
-                <a:latin typeface="Menlo" panose="020B0609030804020204" pitchFamily="49" charset="0"/>
+                <a:latin typeface="Cambria" panose="02040503050406030204" pitchFamily="18" charset="0"/>
               </a:rPr>
-              <a:t>NO TURNING BACK... </a:t>
+              <a:t>NO TURNING BACK …</a:t>
             </a:r>
           </a:p>
           <a:p>
@@ -4276,7 +4301,7 @@
                 <a:solidFill>
                   <a:schemeClr val="bg1"/>
                 </a:solidFill>
-                <a:latin typeface="Menlo" panose="020B0609030804020204" pitchFamily="49" charset="0"/>
+                <a:latin typeface="Cambria" panose="02040503050406030204" pitchFamily="18" charset="0"/>
               </a:rPr>
               <a:t>NO TURNING BACK.</a:t>
             </a:r>
@@ -4286,7 +4311,7 @@
     </p:spTree>
     <p:extLst>
       <p:ext uri="{BB962C8B-B14F-4D97-AF65-F5344CB8AC3E}">
-        <p14:creationId xmlns:p14="http://schemas.microsoft.com/office/powerpoint/2010/main" val="676916637"/>
+        <p14:creationId xmlns:p14="http://schemas.microsoft.com/office/powerpoint/2010/main" val="928957265"/>
       </p:ext>
     </p:extLst>
   </p:cSld>
@@ -4315,10 +4340,10 @@
       </p:grpSpPr>
       <p:sp>
         <p:nvSpPr>
-          <p:cNvPr id="4" name="TextBox 3">
-            <a:extLst>
-              <a:ext uri="{FF2B5EF4-FFF2-40B4-BE49-F238E27FC236}">
-                <a16:creationId xmlns:a16="http://schemas.microsoft.com/office/drawing/2014/main" id="{367E8093-9F57-3724-26D0-5358AC1040DA}"/>
+          <p:cNvPr id="2" name="TextBox 1">
+            <a:extLst>
+              <a:ext uri="{FF2B5EF4-FFF2-40B4-BE49-F238E27FC236}">
+                <a16:creationId xmlns:a16="http://schemas.microsoft.com/office/drawing/2014/main" id="{FFC34AAE-A8B7-C8B7-8737-BDCDBF0848EA}"/>
               </a:ext>
             </a:extLst>
           </p:cNvPr>
@@ -4327,8 +4352,8 @@
         </p:nvSpPr>
         <p:spPr>
           <a:xfrm>
-            <a:off x="-1" y="857839"/>
-            <a:ext cx="8898903" cy="1446550"/>
+            <a:off x="195209" y="868113"/>
+            <a:ext cx="7777114" cy="1446550"/>
           </a:xfrm>
           <a:prstGeom prst="rect">
             <a:avLst/>
@@ -4346,9 +4371,9 @@
                 <a:solidFill>
                   <a:schemeClr val="bg1"/>
                 </a:solidFill>
-                <a:latin typeface="Menlo" panose="020B0609030804020204" pitchFamily="49" charset="0"/>
+                <a:latin typeface="Cambria" panose="02040503050406030204" pitchFamily="18" charset="0"/>
               </a:rPr>
-              <a:t>WILL YOU DECIDE NOW </a:t>
+              <a:t>WILL YOU DECIDED</a:t>
             </a:r>
           </a:p>
           <a:p>
@@ -4357,19 +4382,19 @@
                 <a:solidFill>
                   <a:schemeClr val="bg1"/>
                 </a:solidFill>
-                <a:latin typeface="Menlo" panose="020B0609030804020204" pitchFamily="49" charset="0"/>
+                <a:latin typeface="Cambria" panose="02040503050406030204" pitchFamily="18" charset="0"/>
               </a:rPr>
-              <a:t>TO FOLLOW JESUS?</a:t>
-            </a:r>
-          </a:p>
-        </p:txBody>
-      </p:sp>
-      <p:sp>
-        <p:nvSpPr>
-          <p:cNvPr id="5" name="TextBox 4">
-            <a:extLst>
-              <a:ext uri="{FF2B5EF4-FFF2-40B4-BE49-F238E27FC236}">
-                <a16:creationId xmlns:a16="http://schemas.microsoft.com/office/drawing/2014/main" id="{5A46E485-94B9-08B6-7B44-69ADEFF68F15}"/>
+              <a:t>TO FOLLOW JESUS</a:t>
+            </a:r>
+          </a:p>
+        </p:txBody>
+      </p:sp>
+      <p:sp>
+        <p:nvSpPr>
+          <p:cNvPr id="3" name="TextBox 2">
+            <a:extLst>
+              <a:ext uri="{FF2B5EF4-FFF2-40B4-BE49-F238E27FC236}">
+                <a16:creationId xmlns:a16="http://schemas.microsoft.com/office/drawing/2014/main" id="{0E717774-D95F-695C-E18A-AD3CE1852675}"/>
               </a:ext>
             </a:extLst>
           </p:cNvPr>
@@ -4378,8 +4403,8 @@
         </p:nvSpPr>
         <p:spPr>
           <a:xfrm>
-            <a:off x="0" y="2304389"/>
-            <a:ext cx="8578392" cy="1446550"/>
+            <a:off x="195209" y="2314663"/>
+            <a:ext cx="7777114" cy="1446550"/>
           </a:xfrm>
           <a:prstGeom prst="rect">
             <a:avLst/>
@@ -4397,9 +4422,9 @@
                 <a:solidFill>
                   <a:schemeClr val="bg1"/>
                 </a:solidFill>
-                <a:latin typeface="Menlo" panose="020B0609030804020204" pitchFamily="49" charset="0"/>
+                <a:latin typeface="Cambria" panose="02040503050406030204" pitchFamily="18" charset="0"/>
               </a:rPr>
-              <a:t>WILL YOU DECIDE NOW </a:t>
+              <a:t>WILL YOU DECIDED</a:t>
             </a:r>
           </a:p>
           <a:p>
@@ -4408,9 +4433,9 @@
                 <a:solidFill>
                   <a:schemeClr val="bg1"/>
                 </a:solidFill>
-                <a:latin typeface="Menlo" panose="020B0609030804020204" pitchFamily="49" charset="0"/>
+                <a:latin typeface="Cambria" panose="02040503050406030204" pitchFamily="18" charset="0"/>
               </a:rPr>
-              <a:t>TO FOLLOW JESUS?</a:t>
+              <a:t>TO FOLLOW JESUS</a:t>
             </a:r>
           </a:p>
         </p:txBody>
@@ -4418,7 +4443,7 @@
     </p:spTree>
     <p:extLst>
       <p:ext uri="{BB962C8B-B14F-4D97-AF65-F5344CB8AC3E}">
-        <p14:creationId xmlns:p14="http://schemas.microsoft.com/office/powerpoint/2010/main" val="2950913744"/>
+        <p14:creationId xmlns:p14="http://schemas.microsoft.com/office/powerpoint/2010/main" val="676916637"/>
       </p:ext>
     </p:extLst>
   </p:cSld>
@@ -4447,10 +4472,10 @@
       </p:grpSpPr>
       <p:sp>
         <p:nvSpPr>
-          <p:cNvPr id="4" name="TextBox 3">
-            <a:extLst>
-              <a:ext uri="{FF2B5EF4-FFF2-40B4-BE49-F238E27FC236}">
-                <a16:creationId xmlns:a16="http://schemas.microsoft.com/office/drawing/2014/main" id="{367E8093-9F57-3724-26D0-5358AC1040DA}"/>
+          <p:cNvPr id="2" name="TextBox 1">
+            <a:extLst>
+              <a:ext uri="{FF2B5EF4-FFF2-40B4-BE49-F238E27FC236}">
+                <a16:creationId xmlns:a16="http://schemas.microsoft.com/office/drawing/2014/main" id="{FFC34AAE-A8B7-C8B7-8737-BDCDBF0848EA}"/>
               </a:ext>
             </a:extLst>
           </p:cNvPr>
@@ -4459,8 +4484,8 @@
         </p:nvSpPr>
         <p:spPr>
           <a:xfrm>
-            <a:off x="-1" y="857839"/>
-            <a:ext cx="8898903" cy="1446550"/>
+            <a:off x="195209" y="868113"/>
+            <a:ext cx="7777114" cy="1446550"/>
           </a:xfrm>
           <a:prstGeom prst="rect">
             <a:avLst/>
@@ -4478,9 +4503,9 @@
                 <a:solidFill>
                   <a:schemeClr val="bg1"/>
                 </a:solidFill>
-                <a:latin typeface="Menlo" panose="020B0609030804020204" pitchFamily="49" charset="0"/>
+                <a:latin typeface="Cambria" panose="02040503050406030204" pitchFamily="18" charset="0"/>
               </a:rPr>
-              <a:t>WILL YOU DECIDE NOW </a:t>
+              <a:t>WILL YOU DECIDED</a:t>
             </a:r>
           </a:p>
           <a:p>
@@ -4489,19 +4514,19 @@
                 <a:solidFill>
                   <a:schemeClr val="bg1"/>
                 </a:solidFill>
-                <a:latin typeface="Menlo" panose="020B0609030804020204" pitchFamily="49" charset="0"/>
+                <a:latin typeface="Cambria" panose="02040503050406030204" pitchFamily="18" charset="0"/>
               </a:rPr>
-              <a:t>TO FOLLOW JESUS?</a:t>
-            </a:r>
-          </a:p>
-        </p:txBody>
-      </p:sp>
-      <p:sp>
-        <p:nvSpPr>
-          <p:cNvPr id="5" name="TextBox 4">
-            <a:extLst>
-              <a:ext uri="{FF2B5EF4-FFF2-40B4-BE49-F238E27FC236}">
-                <a16:creationId xmlns:a16="http://schemas.microsoft.com/office/drawing/2014/main" id="{5A46E485-94B9-08B6-7B44-69ADEFF68F15}"/>
+              <a:t>TO FOLLOW JESUS</a:t>
+            </a:r>
+          </a:p>
+        </p:txBody>
+      </p:sp>
+      <p:sp>
+        <p:nvSpPr>
+          <p:cNvPr id="3" name="TextBox 2">
+            <a:extLst>
+              <a:ext uri="{FF2B5EF4-FFF2-40B4-BE49-F238E27FC236}">
+                <a16:creationId xmlns:a16="http://schemas.microsoft.com/office/drawing/2014/main" id="{0E717774-D95F-695C-E18A-AD3CE1852675}"/>
               </a:ext>
             </a:extLst>
           </p:cNvPr>
@@ -4510,8 +4535,8 @@
         </p:nvSpPr>
         <p:spPr>
           <a:xfrm>
-            <a:off x="0" y="2304389"/>
-            <a:ext cx="8578392" cy="1446550"/>
+            <a:off x="195209" y="2314663"/>
+            <a:ext cx="7777114" cy="1446550"/>
           </a:xfrm>
           <a:prstGeom prst="rect">
             <a:avLst/>
@@ -4529,9 +4554,9 @@
                 <a:solidFill>
                   <a:schemeClr val="bg1"/>
                 </a:solidFill>
-                <a:latin typeface="Menlo" panose="020B0609030804020204" pitchFamily="49" charset="0"/>
+                <a:latin typeface="Cambria" panose="02040503050406030204" pitchFamily="18" charset="0"/>
               </a:rPr>
-              <a:t>NO TURNING BACK... </a:t>
+              <a:t>NO TURNING BACK …</a:t>
             </a:r>
           </a:p>
           <a:p>
@@ -4540,7 +4565,7 @@
                 <a:solidFill>
                   <a:schemeClr val="bg1"/>
                 </a:solidFill>
-                <a:latin typeface="Menlo" panose="020B0609030804020204" pitchFamily="49" charset="0"/>
+                <a:latin typeface="Cambria" panose="02040503050406030204" pitchFamily="18" charset="0"/>
               </a:rPr>
               <a:t>NO TURNING BACK.</a:t>
             </a:r>
@@ -4550,7 +4575,7 @@
     </p:spTree>
     <p:extLst>
       <p:ext uri="{BB962C8B-B14F-4D97-AF65-F5344CB8AC3E}">
-        <p14:creationId xmlns:p14="http://schemas.microsoft.com/office/powerpoint/2010/main" val="1917827748"/>
+        <p14:creationId xmlns:p14="http://schemas.microsoft.com/office/powerpoint/2010/main" val="476704778"/>
       </p:ext>
     </p:extLst>
   </p:cSld>

</xml_diff>